<commit_message>
add some screenshots and a few useful references
</commit_message>
<xml_diff>
--- a/docs/tutorial.pptx
+++ b/docs/tutorial.pptx
@@ -5,7 +5,7 @@
     <p:sldMasterId id="2147483648" r:id="rId1"/>
   </p:sldMasterIdLst>
   <p:notesMasterIdLst>
-    <p:notesMasterId r:id="rId21"/>
+    <p:notesMasterId r:id="rId24"/>
   </p:notesMasterIdLst>
   <p:sldIdLst>
     <p:sldId id="256" r:id="rId2"/>
@@ -24,9 +24,12 @@
     <p:sldId id="268" r:id="rId15"/>
     <p:sldId id="269" r:id="rId16"/>
     <p:sldId id="270" r:id="rId17"/>
-    <p:sldId id="274" r:id="rId18"/>
+    <p:sldId id="277" r:id="rId18"/>
     <p:sldId id="272" r:id="rId19"/>
     <p:sldId id="275" r:id="rId20"/>
+    <p:sldId id="278" r:id="rId21"/>
+    <p:sldId id="276" r:id="rId22"/>
+    <p:sldId id="279" r:id="rId23"/>
   </p:sldIdLst>
   <p:sldSz cx="12192000" cy="6858000"/>
   <p:notesSz cx="6858000" cy="9144000"/>
@@ -146,12 +149,18 @@
             <p14:sldId id="268"/>
             <p14:sldId id="269"/>
             <p14:sldId id="270"/>
-            <p14:sldId id="274"/>
+            <p14:sldId id="277"/>
             <p14:sldId id="272"/>
             <p14:sldId id="275"/>
+            <p14:sldId id="278"/>
+            <p14:sldId id="276"/>
+            <p14:sldId id="279"/>
           </p14:sldIdLst>
         </p14:section>
       </p14:sectionLst>
+    </p:ext>
+    <p:ext uri="{EFAFB233-063F-42B5-8137-9DF3F51BA10A}">
+      <p15:sldGuideLst xmlns:p15="http://schemas.microsoft.com/office/powerpoint/2012/main"/>
     </p:ext>
   </p:extLst>
 </p:presentation>
@@ -660,7 +669,7 @@
                 </a:solidFill>
               </a:rPr>
               <a:pPr/>
-              <a:t>6/21/2015 10:29 AM</a:t>
+              <a:t>6/21/2015 9:06 PM</a:t>
             </a:fld>
             <a:endParaRPr lang="en-US" dirty="0">
               <a:solidFill>
@@ -3641,6 +3650,13 @@
   <p:clrMapOvr>
     <a:masterClrMapping/>
   </p:clrMapOvr>
+  <p:timing>
+    <p:tnLst>
+      <p:par>
+        <p:cTn id="1" dur="indefinite" restart="never" nodeType="tmRoot"/>
+      </p:par>
+    </p:tnLst>
+  </p:timing>
 </p:sld>
 </file>
 
@@ -3711,6 +3727,30 @@
           </a:p>
         </p:txBody>
       </p:sp>
+      <p:pic>
+        <p:nvPicPr>
+          <p:cNvPr id="4" name="Picture 3"/>
+          <p:cNvPicPr>
+            <a:picLocks noChangeAspect="1"/>
+          </p:cNvPicPr>
+          <p:nvPr/>
+        </p:nvPicPr>
+        <p:blipFill>
+          <a:blip r:embed="rId2"/>
+          <a:stretch>
+            <a:fillRect/>
+          </a:stretch>
+        </p:blipFill>
+        <p:spPr>
+          <a:xfrm>
+            <a:off x="-42370" y="820016"/>
+            <a:ext cx="12265901" cy="5391605"/>
+          </a:xfrm>
+          <a:prstGeom prst="rect">
+            <a:avLst/>
+          </a:prstGeom>
+        </p:spPr>
+      </p:pic>
     </p:spTree>
     <p:extLst>
       <p:ext uri="{BB962C8B-B14F-4D97-AF65-F5344CB8AC3E}">
@@ -3721,6 +3761,13 @@
   <p:clrMapOvr>
     <a:masterClrMapping/>
   </p:clrMapOvr>
+  <p:timing>
+    <p:tnLst>
+      <p:par>
+        <p:cTn id="1" dur="indefinite" restart="never" nodeType="tmRoot"/>
+      </p:par>
+    </p:tnLst>
+  </p:timing>
 </p:sld>
 </file>
 
@@ -3758,7 +3805,11 @@
           <a:p>
             <a:r>
               <a:rPr lang="en-US" dirty="0" smtClean="0"/>
-              <a:t>Demo Time</a:t>
+              <a:t>Get to Work </a:t>
+            </a:r>
+            <a:r>
+              <a:rPr lang="en-US" dirty="0" smtClean="0"/>
+              <a:t>Time</a:t>
             </a:r>
             <a:endParaRPr lang="en-US" dirty="0"/>
           </a:p>
@@ -3838,11 +3889,7 @@
             <a:pPr lvl="1"/>
             <a:r>
               <a:rPr lang="en-US" dirty="0" smtClean="0"/>
-              <a:t>http://github.com/rgardler</a:t>
-            </a:r>
-            <a:r>
-              <a:rPr lang="en-US" dirty="0" smtClean="0"/>
-              <a:t>/AzureDevTestDeploy</a:t>
+              <a:t>http://github.com/rgardler/AzureDevTestDeploy</a:t>
             </a:r>
             <a:endParaRPr lang="en-US" dirty="0"/>
           </a:p>
@@ -3858,6 +3905,13 @@
   <p:clrMapOvr>
     <a:masterClrMapping/>
   </p:clrMapOvr>
+  <p:timing>
+    <p:tnLst>
+      <p:par>
+        <p:cTn id="1" dur="indefinite" restart="never" nodeType="tmRoot"/>
+      </p:par>
+    </p:tnLst>
+  </p:timing>
 </p:sld>
 </file>
 
@@ -3913,7 +3967,9 @@
         </p:nvSpPr>
         <p:spPr/>
         <p:txBody>
-          <a:bodyPr/>
+          <a:bodyPr>
+            <a:normAutofit/>
+          </a:bodyPr>
           <a:lstStyle/>
           <a:p>
             <a:r>
@@ -3924,7 +3980,7 @@
               <a:rPr lang="en-US" dirty="0" smtClean="0">
                 <a:hlinkClick r:id="rId2"/>
               </a:rPr>
-              <a:t>http://FIXME</a:t>
+              <a:t>http://tutorialstage.cloudapp.net:5050/JerseyHelloWorld/rest/helloworld</a:t>
             </a:r>
             <a:endParaRPr lang="en-US" dirty="0" smtClean="0"/>
           </a:p>
@@ -3935,9 +3991,9 @@
             </a:r>
             <a:r>
               <a:rPr lang="en-US" dirty="0" smtClean="0">
-                <a:hlinkClick r:id="rId2"/>
+                <a:hlinkClick r:id="rId3"/>
               </a:rPr>
-              <a:t>http://FIXME</a:t>
+              <a:t>http://tutorialstage.cloudapp.net/</a:t>
             </a:r>
             <a:endParaRPr lang="en-US" dirty="0" smtClean="0"/>
           </a:p>
@@ -3952,9 +4008,12 @@
               <a:t>Source: </a:t>
             </a:r>
             <a:r>
-              <a:rPr lang="en-US" dirty="0" smtClean="0"/>
+              <a:rPr lang="en-US" dirty="0" smtClean="0">
+                <a:hlinkClick r:id="rId4"/>
+              </a:rPr>
               <a:t>http://github.com/rgardler/AzureDevTestDeploy</a:t>
             </a:r>
+            <a:endParaRPr lang="en-US" dirty="0" smtClean="0"/>
           </a:p>
           <a:p>
             <a:endParaRPr lang="en-US" dirty="0" smtClean="0"/>
@@ -3971,6 +4030,13 @@
   <p:clrMapOvr>
     <a:masterClrMapping/>
   </p:clrMapOvr>
+  <p:timing>
+    <p:tnLst>
+      <p:par>
+        <p:cTn id="1" dur="indefinite" restart="never" nodeType="tmRoot"/>
+      </p:par>
+    </p:tnLst>
+  </p:timing>
 </p:sld>
 </file>
 
@@ -4196,11 +4262,7 @@
             <a:pPr lvl="1"/>
             <a:r>
               <a:rPr lang="en-US" dirty="0" smtClean="0"/>
-              <a:t>Alongside two explanatory docs, one for Hyper-V and one </a:t>
-            </a:r>
-            <a:r>
-              <a:rPr lang="en-US" smtClean="0"/>
-              <a:t>for Azure</a:t>
+              <a:t>Alongside two explanatory docs, one for Hyper-V and one for Azure</a:t>
             </a:r>
             <a:endParaRPr lang="en-US" dirty="0"/>
           </a:p>
@@ -4276,7 +4338,7 @@
           <a:p>
             <a:r>
               <a:rPr lang="en-US" dirty="0" smtClean="0"/>
-              <a:t>environmentSetup.md</a:t>
+              <a:t>See environmentSetup.md</a:t>
             </a:r>
           </a:p>
           <a:p>
@@ -4492,7 +4554,7 @@
           <a:p>
             <a:r>
               <a:rPr lang="en-US" dirty="0" smtClean="0"/>
-              <a:t>Build and Run the Application on Client</a:t>
+              <a:t>Setup Helper Scripts</a:t>
             </a:r>
             <a:endParaRPr lang="en-US" dirty="0"/>
           </a:p>
@@ -4515,47 +4577,7 @@
           <a:p>
             <a:r>
               <a:rPr lang="en-US" dirty="0" smtClean="0"/>
-              <a:t>‘</a:t>
-            </a:r>
-            <a:r>
-              <a:rPr lang="en-US" dirty="0" err="1" smtClean="0"/>
-              <a:t>docker</a:t>
-            </a:r>
-            <a:r>
-              <a:rPr lang="en-US" dirty="0" smtClean="0"/>
-              <a:t>-machine create -d hyper-v dev’</a:t>
-            </a:r>
-          </a:p>
-          <a:p>
-            <a:pPr lvl="1"/>
-            <a:r>
-              <a:rPr lang="en-US" dirty="0" smtClean="0"/>
-              <a:t>Where ‘dev’ is the name of the </a:t>
-            </a:r>
-            <a:r>
-              <a:rPr lang="en-US" dirty="0" err="1" smtClean="0"/>
-              <a:t>docker</a:t>
-            </a:r>
-            <a:r>
-              <a:rPr lang="en-US" dirty="0" smtClean="0"/>
-              <a:t> host</a:t>
-            </a:r>
-          </a:p>
-          <a:p>
-            <a:pPr lvl="1"/>
-            <a:endParaRPr lang="en-US" dirty="0"/>
-          </a:p>
-          <a:p>
-            <a:r>
-              <a:rPr lang="en-US" dirty="0" smtClean="0"/>
-              <a:t>For convenience there are scripts to build and run the containers in ‘scripts’</a:t>
-            </a:r>
-          </a:p>
-          <a:p>
-            <a:pPr lvl="1"/>
-            <a:r>
-              <a:rPr lang="en-US" dirty="0" smtClean="0"/>
-              <a:t>Copy ‘scripts/</a:t>
+              <a:t>Copy ‘script/</a:t>
             </a:r>
             <a:r>
               <a:rPr lang="en-US" dirty="0" err="1" smtClean="0"/>
@@ -4563,38 +4585,38 @@
             </a:r>
             <a:r>
               <a:rPr lang="en-US" dirty="0" smtClean="0"/>
-              <a:t>/ to ‘scripts/config.sh’</a:t>
-            </a:r>
-          </a:p>
-          <a:p>
-            <a:pPr lvl="2"/>
-            <a:r>
-              <a:rPr lang="en-US" dirty="0" smtClean="0"/>
-              <a:t>No need to edit this if you use the example machine names in this deck</a:t>
-            </a:r>
-          </a:p>
-          <a:p>
-            <a:pPr lvl="2"/>
+              <a:t>’ to ‘script/config.sh’</a:t>
+            </a:r>
+          </a:p>
+          <a:p>
             <a:endParaRPr lang="en-US" dirty="0"/>
           </a:p>
           <a:p>
             <a:r>
               <a:rPr lang="en-US" dirty="0" smtClean="0"/>
-              <a:t>Run ‘scripts/dev.sh’</a:t>
+              <a:t>Edit ‘script/config.sh’</a:t>
             </a:r>
           </a:p>
           <a:p>
             <a:pPr lvl="1"/>
             <a:r>
               <a:rPr lang="en-US" dirty="0" smtClean="0"/>
-              <a:t>Will build and run both containers on your dev client</a:t>
-            </a:r>
-            <a:endParaRPr lang="en-US" dirty="0" smtClean="0"/>
-          </a:p>
-          <a:p>
-            <a:endParaRPr lang="en-US" dirty="0" smtClean="0"/>
-          </a:p>
-          <a:p>
+              <a:t>At least change STAGE_MACHINE_NAME</a:t>
+            </a:r>
+          </a:p>
+          <a:p>
+            <a:pPr lvl="1"/>
+            <a:r>
+              <a:rPr lang="en-US" dirty="0" smtClean="0"/>
+              <a:t>Must be world unique, e.g. stageMyInitials123</a:t>
+            </a:r>
+          </a:p>
+          <a:p>
+            <a:pPr lvl="1"/>
+            <a:r>
+              <a:rPr lang="en-US" dirty="0" smtClean="0"/>
+              <a:t>This will be the machine name and DNS name for your Docker host in azure</a:t>
+            </a:r>
             <a:endParaRPr lang="en-US" dirty="0"/>
           </a:p>
         </p:txBody>
@@ -4602,7 +4624,7 @@
     </p:spTree>
     <p:extLst>
       <p:ext uri="{BB962C8B-B14F-4D97-AF65-F5344CB8AC3E}">
-        <p14:creationId xmlns:p14="http://schemas.microsoft.com/office/powerpoint/2010/main" val="4146152528"/>
+        <p14:creationId xmlns:p14="http://schemas.microsoft.com/office/powerpoint/2010/main" val="1112266035"/>
       </p:ext>
     </p:extLst>
   </p:cSld>
@@ -4670,7 +4692,7 @@
         </p:spPr>
         <p:txBody>
           <a:bodyPr>
-            <a:normAutofit fontScale="92500" lnSpcReduction="20000"/>
+            <a:normAutofit fontScale="85000" lnSpcReduction="20000"/>
           </a:bodyPr>
           <a:lstStyle/>
           <a:p>
@@ -4696,7 +4718,11 @@
           <a:p>
             <a:r>
               <a:rPr lang="en-US" dirty="0" smtClean="0"/>
-              <a:t>Create a management cert</a:t>
+              <a:t>In project root, create </a:t>
+            </a:r>
+            <a:r>
+              <a:rPr lang="en-US" dirty="0" smtClean="0"/>
+              <a:t>a management cert</a:t>
             </a:r>
           </a:p>
           <a:p>
@@ -4828,7 +4854,7 @@
               <a:rPr lang="en-US" dirty="0" smtClean="0">
                 <a:hlinkClick r:id="rId3"/>
               </a:rPr>
-              <a:t>https://portal.azure.com</a:t>
+              <a:t>http://manage.windowsazure.com</a:t>
             </a:r>
             <a:endParaRPr lang="en-US" dirty="0" smtClean="0"/>
           </a:p>
@@ -4836,8 +4862,21 @@
             <a:pPr lvl="1"/>
             <a:r>
               <a:rPr lang="en-US" dirty="0" smtClean="0"/>
-              <a:t>In the "Settings" section select "Management Certificates“</a:t>
-            </a:r>
+              <a:t>In the "</a:t>
+            </a:r>
+            <a:r>
+              <a:rPr lang="en-US" dirty="0" smtClean="0"/>
+              <a:t>Settings“ (at bottom of left menu) </a:t>
+            </a:r>
+            <a:r>
+              <a:rPr lang="en-US" dirty="0" smtClean="0"/>
+              <a:t>section select "Management Certificates</a:t>
+            </a:r>
+            <a:r>
+              <a:rPr lang="en-US" dirty="0" smtClean="0"/>
+              <a:t>“ (on tabs across top)</a:t>
+            </a:r>
+            <a:endParaRPr lang="en-US" dirty="0" smtClean="0"/>
           </a:p>
           <a:p>
             <a:pPr lvl="1"/>
@@ -4846,8 +4885,20 @@
           <a:p>
             <a:r>
               <a:rPr lang="en-US" dirty="0" smtClean="0"/>
-              <a:t>Grab subscription ID from portal and record it somewhere</a:t>
-            </a:r>
+              <a:t>Grab subscription ID from portal and record it </a:t>
+            </a:r>
+            <a:r>
+              <a:rPr lang="en-US" dirty="0" smtClean="0"/>
+              <a:t>somewhere</a:t>
+            </a:r>
+          </a:p>
+          <a:p>
+            <a:pPr lvl="1"/>
+            <a:r>
+              <a:rPr lang="en-US" dirty="0" smtClean="0"/>
+              <a:t>See the “Subscriptions” tab of the “Settings” section</a:t>
+            </a:r>
+            <a:endParaRPr lang="en-US" dirty="0" smtClean="0"/>
           </a:p>
         </p:txBody>
       </p:sp>
@@ -4917,7 +4968,7 @@
         <p:spPr/>
         <p:txBody>
           <a:bodyPr>
-            <a:normAutofit fontScale="92500" lnSpcReduction="20000"/>
+            <a:normAutofit fontScale="85000" lnSpcReduction="20000"/>
           </a:bodyPr>
           <a:lstStyle/>
           <a:p>
@@ -4939,22 +4990,32 @@
             </a:r>
             <a:r>
               <a:rPr lang="en-US" dirty="0" smtClean="0"/>
-              <a:t>" MACHINE_NAME’</a:t>
-            </a:r>
+              <a:t>" </a:t>
+            </a:r>
+            <a:r>
+              <a:rPr lang="en-US" dirty="0" smtClean="0"/>
+              <a:t>MACHINE_NAME’</a:t>
+            </a:r>
+            <a:endParaRPr lang="en-US" dirty="0" smtClean="0"/>
           </a:p>
           <a:p>
             <a:pPr lvl="1"/>
             <a:r>
               <a:rPr lang="en-US" dirty="0" smtClean="0"/>
-              <a:t>Replace AZURE_SUBSCRIPTION_ID with the subscription ID retrieved from the Azure portal</a:t>
+              <a:t>Replace AZURE_SUBSCRIPTION_ID with the subscription ID retrieved from the Azure </a:t>
+            </a:r>
+            <a:r>
+              <a:rPr lang="en-US" dirty="0" smtClean="0"/>
+              <a:t>portal</a:t>
             </a:r>
           </a:p>
           <a:p>
             <a:pPr lvl="1"/>
             <a:r>
               <a:rPr lang="en-US" dirty="0" smtClean="0"/>
-              <a:t>Replace MACHINE_NAME with your preferred name, e.g. ‘stage’</a:t>
-            </a:r>
+              <a:t>Replace MACHINE_NAME with whatever you used for STAGE_MACHINE_NAME in config.sh</a:t>
+            </a:r>
+            <a:endParaRPr lang="en-US" dirty="0" smtClean="0"/>
           </a:p>
           <a:p>
             <a:pPr lvl="1"/>
@@ -4963,38 +5024,108 @@
           <a:p>
             <a:r>
               <a:rPr lang="en-US" dirty="0" smtClean="0"/>
-              <a:t>‘scripts/stage.sh’</a:t>
+              <a:t>‘</a:t>
+            </a:r>
+            <a:r>
+              <a:rPr lang="en-US" dirty="0" err="1" smtClean="0"/>
+              <a:t>eval</a:t>
+            </a:r>
+            <a:r>
+              <a:rPr lang="en-US" dirty="0" smtClean="0"/>
+              <a:t> “$(</a:t>
+            </a:r>
+            <a:r>
+              <a:rPr lang="en-US" dirty="0" err="1" smtClean="0"/>
+              <a:t>docker</a:t>
+            </a:r>
+            <a:r>
+              <a:rPr lang="en-US" dirty="0" smtClean="0"/>
+              <a:t>-machine </a:t>
+            </a:r>
+            <a:r>
+              <a:rPr lang="en-US" dirty="0" err="1" smtClean="0"/>
+              <a:t>env</a:t>
+            </a:r>
+            <a:r>
+              <a:rPr lang="en-US" dirty="0" smtClean="0"/>
+              <a:t> </a:t>
+            </a:r>
+            <a:r>
+              <a:rPr lang="en-US" dirty="0" smtClean="0"/>
+              <a:t>MACHINE_NAME)”’</a:t>
+            </a:r>
+          </a:p>
+          <a:p>
+            <a:pPr marL="0" indent="0">
+              <a:buNone/>
+            </a:pPr>
+            <a:endParaRPr lang="en-US" dirty="0" smtClean="0"/>
+          </a:p>
+          <a:p>
+            <a:r>
+              <a:rPr lang="en-US" dirty="0" smtClean="0"/>
+              <a:t>‘</a:t>
+            </a:r>
+            <a:r>
+              <a:rPr lang="en-US" dirty="0" smtClean="0"/>
+              <a:t>scripts/stage.sh</a:t>
+            </a:r>
+            <a:r>
+              <a:rPr lang="en-US" dirty="0" smtClean="0"/>
+              <a:t>’</a:t>
+            </a:r>
+            <a:endParaRPr lang="en-US" dirty="0" smtClean="0"/>
+          </a:p>
+          <a:p>
+            <a:pPr marL="0" indent="0">
+              <a:buNone/>
+            </a:pPr>
+            <a:endParaRPr lang="en-US" dirty="0" smtClean="0"/>
+          </a:p>
+          <a:p>
+            <a:r>
+              <a:rPr lang="en-US" dirty="0" smtClean="0"/>
+              <a:t>Open necessary ports on Azure VM (via </a:t>
+            </a:r>
+            <a:r>
+              <a:rPr lang="en-US" dirty="0" smtClean="0">
+                <a:hlinkClick r:id="rId2"/>
+              </a:rPr>
+              <a:t>http://manage.windowsazure.com</a:t>
+            </a:r>
+            <a:r>
+              <a:rPr lang="en-US" dirty="0" smtClean="0"/>
+              <a:t>)</a:t>
             </a:r>
           </a:p>
           <a:p>
             <a:pPr lvl="1"/>
             <a:r>
               <a:rPr lang="en-US" dirty="0" smtClean="0"/>
-              <a:t>Will build and run both containers in Azure</a:t>
-            </a:r>
-            <a:endParaRPr lang="en-US" dirty="0"/>
-          </a:p>
-          <a:p>
-            <a:endParaRPr lang="en-US" dirty="0" smtClean="0"/>
-          </a:p>
-          <a:p>
-            <a:r>
-              <a:rPr lang="en-US" dirty="0" smtClean="0"/>
-              <a:t>Open necessary ports on Azure VM</a:t>
+              <a:t>80:80 </a:t>
+            </a:r>
+            <a:r>
+              <a:rPr lang="en-US" dirty="0" smtClean="0"/>
+              <a:t>for </a:t>
+            </a:r>
+            <a:r>
+              <a:rPr lang="en-US" dirty="0" smtClean="0"/>
+              <a:t>the </a:t>
+            </a:r>
+            <a:r>
+              <a:rPr lang="en-US" dirty="0" smtClean="0"/>
+              <a:t>Web interface</a:t>
             </a:r>
           </a:p>
           <a:p>
             <a:pPr lvl="1"/>
             <a:r>
               <a:rPr lang="en-US" dirty="0" smtClean="0"/>
-              <a:t>80 for he Web interface</a:t>
-            </a:r>
-          </a:p>
-          <a:p>
-            <a:pPr lvl="1"/>
-            <a:r>
-              <a:rPr lang="en-US" dirty="0" smtClean="0"/>
-              <a:t>5050 for the REST API (optional)</a:t>
+              <a:t>5050:5050 </a:t>
+            </a:r>
+            <a:r>
+              <a:rPr lang="en-US" dirty="0" smtClean="0"/>
+              <a:t>for the REST API (optional)</a:t>
             </a:r>
           </a:p>
         </p:txBody>
@@ -5206,6 +5337,445 @@
   <p:clrMapOvr>
     <a:masterClrMapping/>
   </p:clrMapOvr>
+</p:sld>
+</file>
+
+<file path=ppt/slides/slide20.xml><?xml version="1.0" encoding="utf-8"?>
+<p:sld xmlns:a="http://schemas.openxmlformats.org/drawingml/2006/main" xmlns:r="http://schemas.openxmlformats.org/officeDocument/2006/relationships" xmlns:p="http://schemas.openxmlformats.org/presentationml/2006/main">
+  <p:cSld>
+    <p:spTree>
+      <p:nvGrpSpPr>
+        <p:cNvPr id="1" name=""/>
+        <p:cNvGrpSpPr/>
+        <p:nvPr/>
+      </p:nvGrpSpPr>
+      <p:grpSpPr>
+        <a:xfrm>
+          <a:off x="0" y="0"/>
+          <a:ext cx="0" cy="0"/>
+          <a:chOff x="0" y="0"/>
+          <a:chExt cx="0" cy="0"/>
+        </a:xfrm>
+      </p:grpSpPr>
+      <p:sp>
+        <p:nvSpPr>
+          <p:cNvPr id="2" name="Title 1"/>
+          <p:cNvSpPr>
+            <a:spLocks noGrp="1"/>
+          </p:cNvSpPr>
+          <p:nvPr>
+            <p:ph type="title"/>
+          </p:nvPr>
+        </p:nvSpPr>
+        <p:spPr/>
+        <p:txBody>
+          <a:bodyPr/>
+          <a:lstStyle/>
+          <a:p>
+            <a:endParaRPr lang="en-US"/>
+          </a:p>
+        </p:txBody>
+      </p:sp>
+      <p:sp>
+        <p:nvSpPr>
+          <p:cNvPr id="3" name="Content Placeholder 2"/>
+          <p:cNvSpPr>
+            <a:spLocks noGrp="1"/>
+          </p:cNvSpPr>
+          <p:nvPr>
+            <p:ph idx="1"/>
+          </p:nvPr>
+        </p:nvSpPr>
+        <p:spPr/>
+        <p:txBody>
+          <a:bodyPr/>
+          <a:lstStyle/>
+          <a:p>
+            <a:r>
+              <a:rPr lang="en-US" dirty="0"/>
+              <a:t>REST </a:t>
+            </a:r>
+            <a:r>
+              <a:rPr lang="en-US" dirty="0" smtClean="0"/>
+              <a:t>API</a:t>
+            </a:r>
+          </a:p>
+          <a:p>
+            <a:pPr marL="457200" lvl="1" indent="0">
+              <a:buNone/>
+            </a:pPr>
+            <a:endParaRPr lang="en-US" dirty="0" smtClean="0">
+              <a:hlinkClick r:id="rId2"/>
+            </a:endParaRPr>
+          </a:p>
+          <a:p>
+            <a:pPr marL="457200" lvl="1" indent="0">
+              <a:buNone/>
+            </a:pPr>
+            <a:r>
+              <a:rPr lang="en-US" dirty="0" smtClean="0">
+                <a:hlinkClick r:id="rId2"/>
+              </a:rPr>
+              <a:t>http://MACHINE_NAME.cloudapp.net:5050/JerseyHelloWorld/rest/helloworld</a:t>
+            </a:r>
+            <a:endParaRPr lang="en-US" dirty="0" smtClean="0"/>
+          </a:p>
+          <a:p>
+            <a:pPr marL="457200" lvl="1" indent="0">
+              <a:buNone/>
+            </a:pPr>
+            <a:endParaRPr lang="en-US" dirty="0"/>
+          </a:p>
+          <a:p>
+            <a:r>
+              <a:rPr lang="en-US" dirty="0" smtClean="0"/>
+              <a:t>Web</a:t>
+            </a:r>
+          </a:p>
+          <a:p>
+            <a:pPr marL="0" indent="0">
+              <a:buNone/>
+            </a:pPr>
+            <a:endParaRPr lang="en-US" dirty="0" smtClean="0"/>
+          </a:p>
+          <a:p>
+            <a:pPr marL="457200" lvl="1" indent="0">
+              <a:buNone/>
+            </a:pPr>
+            <a:r>
+              <a:rPr lang="en-US" dirty="0" smtClean="0">
+                <a:hlinkClick r:id="rId3"/>
+              </a:rPr>
+              <a:t>http://MACHINE_NAME.cloudapp.net</a:t>
+            </a:r>
+            <a:r>
+              <a:rPr lang="en-US" dirty="0">
+                <a:hlinkClick r:id="rId3"/>
+              </a:rPr>
+              <a:t>/</a:t>
+            </a:r>
+            <a:endParaRPr lang="en-US" dirty="0"/>
+          </a:p>
+        </p:txBody>
+      </p:sp>
+    </p:spTree>
+    <p:extLst>
+      <p:ext uri="{BB962C8B-B14F-4D97-AF65-F5344CB8AC3E}">
+        <p14:creationId xmlns:p14="http://schemas.microsoft.com/office/powerpoint/2010/main" val="1135983599"/>
+      </p:ext>
+    </p:extLst>
+  </p:cSld>
+  <p:clrMapOvr>
+    <a:masterClrMapping/>
+  </p:clrMapOvr>
+</p:sld>
+</file>
+
+<file path=ppt/slides/slide21.xml><?xml version="1.0" encoding="utf-8"?>
+<p:sld xmlns:a="http://schemas.openxmlformats.org/drawingml/2006/main" xmlns:r="http://schemas.openxmlformats.org/officeDocument/2006/relationships" xmlns:p="http://schemas.openxmlformats.org/presentationml/2006/main">
+  <p:cSld>
+    <p:spTree>
+      <p:nvGrpSpPr>
+        <p:cNvPr id="1" name=""/>
+        <p:cNvGrpSpPr/>
+        <p:nvPr/>
+      </p:nvGrpSpPr>
+      <p:grpSpPr>
+        <a:xfrm>
+          <a:off x="0" y="0"/>
+          <a:ext cx="0" cy="0"/>
+          <a:chOff x="0" y="0"/>
+          <a:chExt cx="0" cy="0"/>
+        </a:xfrm>
+      </p:grpSpPr>
+      <p:sp>
+        <p:nvSpPr>
+          <p:cNvPr id="2" name="Title 1"/>
+          <p:cNvSpPr>
+            <a:spLocks noGrp="1"/>
+          </p:cNvSpPr>
+          <p:nvPr>
+            <p:ph type="title"/>
+          </p:nvPr>
+        </p:nvSpPr>
+        <p:spPr/>
+        <p:txBody>
+          <a:bodyPr/>
+          <a:lstStyle/>
+          <a:p>
+            <a:r>
+              <a:rPr lang="en-US" dirty="0" smtClean="0"/>
+              <a:t>Build and Run the Application on Client</a:t>
+            </a:r>
+            <a:endParaRPr lang="en-US" dirty="0"/>
+          </a:p>
+        </p:txBody>
+      </p:sp>
+      <p:sp>
+        <p:nvSpPr>
+          <p:cNvPr id="3" name="Content Placeholder 2"/>
+          <p:cNvSpPr>
+            <a:spLocks noGrp="1"/>
+          </p:cNvSpPr>
+          <p:nvPr>
+            <p:ph idx="1"/>
+          </p:nvPr>
+        </p:nvSpPr>
+        <p:spPr>
+          <a:xfrm>
+            <a:off x="838200" y="1794803"/>
+            <a:ext cx="10515600" cy="4351338"/>
+          </a:xfrm>
+        </p:spPr>
+        <p:txBody>
+          <a:bodyPr>
+            <a:normAutofit/>
+          </a:bodyPr>
+          <a:lstStyle/>
+          <a:p>
+            <a:r>
+              <a:rPr lang="en-US" dirty="0" smtClean="0"/>
+              <a:t>‘</a:t>
+            </a:r>
+            <a:r>
+              <a:rPr lang="en-US" dirty="0" err="1" smtClean="0"/>
+              <a:t>docker</a:t>
+            </a:r>
+            <a:r>
+              <a:rPr lang="en-US" dirty="0" smtClean="0"/>
+              <a:t>-machine create -d hyper-v dev’</a:t>
+            </a:r>
+          </a:p>
+          <a:p>
+            <a:pPr lvl="1"/>
+            <a:r>
+              <a:rPr lang="en-US" dirty="0" smtClean="0"/>
+              <a:t>Must be run as an </a:t>
+            </a:r>
+            <a:r>
+              <a:rPr lang="en-US" dirty="0" smtClean="0"/>
+              <a:t>Administrator</a:t>
+            </a:r>
+            <a:endParaRPr lang="en-US" dirty="0" smtClean="0"/>
+          </a:p>
+          <a:p>
+            <a:pPr lvl="1"/>
+            <a:endParaRPr lang="en-US" dirty="0"/>
+          </a:p>
+          <a:p>
+            <a:r>
+              <a:rPr lang="en-US" dirty="0" smtClean="0"/>
+              <a:t>‘</a:t>
+            </a:r>
+            <a:r>
+              <a:rPr lang="en-US" dirty="0" err="1" smtClean="0"/>
+              <a:t>eval</a:t>
+            </a:r>
+            <a:r>
+              <a:rPr lang="en-US" dirty="0" smtClean="0"/>
+              <a:t> “$(</a:t>
+            </a:r>
+            <a:r>
+              <a:rPr lang="en-US" dirty="0" err="1" smtClean="0"/>
+              <a:t>docker</a:t>
+            </a:r>
+            <a:r>
+              <a:rPr lang="en-US" dirty="0" smtClean="0"/>
+              <a:t>-machine </a:t>
+            </a:r>
+            <a:r>
+              <a:rPr lang="en-US" dirty="0" err="1" smtClean="0"/>
+              <a:t>env</a:t>
+            </a:r>
+            <a:r>
+              <a:rPr lang="en-US" dirty="0" smtClean="0"/>
+              <a:t> dev)”’</a:t>
+            </a:r>
+          </a:p>
+          <a:p>
+            <a:pPr marL="914400" lvl="2" indent="0">
+              <a:buNone/>
+            </a:pPr>
+            <a:endParaRPr lang="en-US" dirty="0"/>
+          </a:p>
+          <a:p>
+            <a:r>
+              <a:rPr lang="en-US" dirty="0" smtClean="0"/>
+              <a:t>Run ‘scripts/dev.sh’</a:t>
+            </a:r>
+          </a:p>
+          <a:p>
+            <a:pPr lvl="1"/>
+            <a:r>
+              <a:rPr lang="en-US" dirty="0" smtClean="0"/>
+              <a:t>Will build and run both containers on your dev client</a:t>
+            </a:r>
+          </a:p>
+          <a:p>
+            <a:endParaRPr lang="en-US" dirty="0" smtClean="0"/>
+          </a:p>
+          <a:p>
+            <a:endParaRPr lang="en-US" dirty="0"/>
+          </a:p>
+        </p:txBody>
+      </p:sp>
+    </p:spTree>
+    <p:extLst>
+      <p:ext uri="{BB962C8B-B14F-4D97-AF65-F5344CB8AC3E}">
+        <p14:creationId xmlns:p14="http://schemas.microsoft.com/office/powerpoint/2010/main" val="409503179"/>
+      </p:ext>
+    </p:extLst>
+  </p:cSld>
+  <p:clrMapOvr>
+    <a:masterClrMapping/>
+  </p:clrMapOvr>
+  <p:timing>
+    <p:tnLst>
+      <p:par>
+        <p:cTn id="1" dur="indefinite" restart="never" nodeType="tmRoot"/>
+      </p:par>
+    </p:tnLst>
+  </p:timing>
+</p:sld>
+</file>
+
+<file path=ppt/slides/slide22.xml><?xml version="1.0" encoding="utf-8"?>
+<p:sld xmlns:a="http://schemas.openxmlformats.org/drawingml/2006/main" xmlns:r="http://schemas.openxmlformats.org/officeDocument/2006/relationships" xmlns:p="http://schemas.openxmlformats.org/presentationml/2006/main">
+  <p:cSld>
+    <p:spTree>
+      <p:nvGrpSpPr>
+        <p:cNvPr id="1" name=""/>
+        <p:cNvGrpSpPr/>
+        <p:nvPr/>
+      </p:nvGrpSpPr>
+      <p:grpSpPr>
+        <a:xfrm>
+          <a:off x="0" y="0"/>
+          <a:ext cx="0" cy="0"/>
+          <a:chOff x="0" y="0"/>
+          <a:chExt cx="0" cy="0"/>
+        </a:xfrm>
+      </p:grpSpPr>
+      <p:sp>
+        <p:nvSpPr>
+          <p:cNvPr id="2" name="Title 1"/>
+          <p:cNvSpPr>
+            <a:spLocks noGrp="1"/>
+          </p:cNvSpPr>
+          <p:nvPr>
+            <p:ph type="title"/>
+          </p:nvPr>
+        </p:nvSpPr>
+        <p:spPr/>
+        <p:txBody>
+          <a:bodyPr/>
+          <a:lstStyle/>
+          <a:p>
+            <a:r>
+              <a:rPr lang="en-US" dirty="0" smtClean="0"/>
+              <a:t>Pointers</a:t>
+            </a:r>
+            <a:endParaRPr lang="en-US" dirty="0"/>
+          </a:p>
+        </p:txBody>
+      </p:sp>
+      <p:sp>
+        <p:nvSpPr>
+          <p:cNvPr id="3" name="Content Placeholder 2"/>
+          <p:cNvSpPr>
+            <a:spLocks noGrp="1"/>
+          </p:cNvSpPr>
+          <p:nvPr>
+            <p:ph idx="1"/>
+          </p:nvPr>
+        </p:nvSpPr>
+        <p:spPr/>
+        <p:txBody>
+          <a:bodyPr/>
+          <a:lstStyle/>
+          <a:p>
+            <a:r>
+              <a:rPr lang="en-US" dirty="0" smtClean="0"/>
+              <a:t>environmentSetup.md</a:t>
+            </a:r>
+          </a:p>
+          <a:p>
+            <a:pPr lvl="1"/>
+            <a:r>
+              <a:rPr lang="en-US" dirty="0" smtClean="0"/>
+              <a:t>how to set up your client machine</a:t>
+            </a:r>
+          </a:p>
+          <a:p>
+            <a:pPr lvl="1"/>
+            <a:endParaRPr lang="en-US" dirty="0"/>
+          </a:p>
+          <a:p>
+            <a:r>
+              <a:rPr lang="en-US" dirty="0" smtClean="0"/>
+              <a:t>docs/Getting Started with Hyper-v.md</a:t>
+            </a:r>
+          </a:p>
+          <a:p>
+            <a:pPr lvl="1"/>
+            <a:r>
+              <a:rPr lang="en-US" dirty="0" smtClean="0"/>
+              <a:t>Step by step instructions for starting a Hyper-V host and deploying the application to it</a:t>
+            </a:r>
+          </a:p>
+          <a:p>
+            <a:pPr lvl="1"/>
+            <a:endParaRPr lang="en-US" dirty="0"/>
+          </a:p>
+          <a:p>
+            <a:r>
+              <a:rPr lang="en-US" dirty="0"/>
+              <a:t>docs/Getting Started with </a:t>
+            </a:r>
+            <a:r>
+              <a:rPr lang="en-US" dirty="0" smtClean="0"/>
+              <a:t>Azure.md</a:t>
+            </a:r>
+            <a:endParaRPr lang="en-US" dirty="0"/>
+          </a:p>
+          <a:p>
+            <a:pPr lvl="1"/>
+            <a:r>
+              <a:rPr lang="en-US" dirty="0"/>
+              <a:t>Step by step instructions for starting </a:t>
+            </a:r>
+            <a:r>
+              <a:rPr lang="en-US" smtClean="0"/>
+              <a:t>an Azure </a:t>
+            </a:r>
+            <a:r>
+              <a:rPr lang="en-US" dirty="0"/>
+              <a:t>host and deploying the application to it</a:t>
+            </a:r>
+          </a:p>
+          <a:p>
+            <a:pPr lvl="1"/>
+            <a:endParaRPr lang="en-US" dirty="0" smtClean="0"/>
+          </a:p>
+        </p:txBody>
+      </p:sp>
+    </p:spTree>
+    <p:extLst>
+      <p:ext uri="{BB962C8B-B14F-4D97-AF65-F5344CB8AC3E}">
+        <p14:creationId xmlns:p14="http://schemas.microsoft.com/office/powerpoint/2010/main" val="3253595211"/>
+      </p:ext>
+    </p:extLst>
+  </p:cSld>
+  <p:clrMapOvr>
+    <a:masterClrMapping/>
+  </p:clrMapOvr>
+  <p:timing>
+    <p:tnLst>
+      <p:par>
+        <p:cTn id="1" dur="indefinite" restart="never" nodeType="tmRoot"/>
+      </p:par>
+    </p:tnLst>
+  </p:timing>
 </p:sld>
 </file>
 
@@ -5608,25 +6178,8 @@
                   </a:srgbClr>
                 </a:solidFill>
               </a:rPr>
-              <a:t>Why Azure </a:t>
-            </a:r>
-            <a:r>
-              <a:rPr lang="en-US" sz="5881" dirty="0">
-                <a:solidFill>
-                  <a:srgbClr val="505050">
-                    <a:lumMod val="50000"/>
-                  </a:srgbClr>
-                </a:solidFill>
-              </a:rPr>
-              <a:t>Cloud?</a:t>
-            </a:r>
-            <a:endParaRPr lang="en-US" sz="5881" dirty="0">
-              <a:solidFill>
-                <a:srgbClr val="505050">
-                  <a:lumMod val="50000"/>
-                </a:srgbClr>
-              </a:solidFill>
-            </a:endParaRPr>
+              <a:t>Why Azure Cloud?</a:t>
+            </a:r>
           </a:p>
         </p:txBody>
       </p:sp>
@@ -8152,13 +8705,13 @@
   <p:clrMapOvr>
     <a:masterClrMapping/>
   </p:clrMapOvr>
-  <mc:AlternateContent xmlns:mc="http://schemas.openxmlformats.org/markup-compatibility/2006">
-    <mc:Choice xmlns:p14="http://schemas.microsoft.com/office/powerpoint/2010/main" Requires="p14">
+  <mc:AlternateContent xmlns:mc="http://schemas.openxmlformats.org/markup-compatibility/2006" xmlns:p14="http://schemas.microsoft.com/office/powerpoint/2010/main">
+    <mc:Choice Requires="p14">
       <p:transition spd="med" p14:dur="700">
         <p:fade/>
       </p:transition>
     </mc:Choice>
-    <mc:Fallback>
+    <mc:Fallback xmlns="">
       <p:transition spd="med">
         <p:fade/>
       </p:transition>
@@ -8565,11 +9118,11 @@
   <p:clrMapOvr>
     <a:masterClrMapping/>
   </p:clrMapOvr>
-  <mc:AlternateContent xmlns:mc="http://schemas.openxmlformats.org/markup-compatibility/2006">
-    <mc:Choice xmlns:p14="http://schemas.microsoft.com/office/powerpoint/2010/main" Requires="p14">
+  <mc:AlternateContent xmlns:mc="http://schemas.openxmlformats.org/markup-compatibility/2006" xmlns:p14="http://schemas.microsoft.com/office/powerpoint/2010/main">
+    <mc:Choice Requires="p14">
       <p:transition spd="slow" p14:dur="2000"/>
     </mc:Choice>
-    <mc:Fallback>
+    <mc:Fallback xmlns="">
       <p:transition spd="slow"/>
     </mc:Fallback>
   </mc:AlternateContent>
@@ -8662,11 +9215,11 @@
   <p:clrMapOvr>
     <a:masterClrMapping/>
   </p:clrMapOvr>
-  <mc:AlternateContent xmlns:mc="http://schemas.openxmlformats.org/markup-compatibility/2006">
-    <mc:Choice xmlns:p14="http://schemas.microsoft.com/office/powerpoint/2010/main" Requires="p14">
+  <mc:AlternateContent xmlns:mc="http://schemas.openxmlformats.org/markup-compatibility/2006" xmlns:p14="http://schemas.microsoft.com/office/powerpoint/2010/main">
+    <mc:Choice Requires="p14">
       <p:transition spd="slow" p14:dur="2000"/>
     </mc:Choice>
-    <mc:Fallback>
+    <mc:Fallback xmlns="">
       <p:transition spd="slow"/>
     </mc:Fallback>
   </mc:AlternateContent>
@@ -8864,6 +9417,13 @@
   <p:clrMapOvr>
     <a:masterClrMapping/>
   </p:clrMapOvr>
+  <p:timing>
+    <p:tnLst>
+      <p:par>
+        <p:cTn id="1" dur="indefinite" restart="never" nodeType="tmRoot"/>
+      </p:par>
+    </p:tnLst>
+  </p:timing>
 </p:sld>
 </file>
 
@@ -8960,6 +9520,13 @@
   <p:clrMapOvr>
     <a:masterClrMapping/>
   </p:clrMapOvr>
+  <p:timing>
+    <p:tnLst>
+      <p:par>
+        <p:cTn id="1" dur="indefinite" restart="never" nodeType="tmRoot"/>
+      </p:par>
+    </p:tnLst>
+  </p:timing>
 </p:sld>
 </file>
 
@@ -9003,29 +9570,56 @@
           </a:p>
         </p:txBody>
       </p:sp>
-      <p:sp>
-        <p:nvSpPr>
-          <p:cNvPr id="3" name="Content Placeholder 2"/>
-          <p:cNvSpPr>
-            <a:spLocks noGrp="1"/>
-          </p:cNvSpPr>
+      <p:pic>
+        <p:nvPicPr>
+          <p:cNvPr id="5" name="Content Placeholder 4"/>
+          <p:cNvPicPr>
+            <a:picLocks noGrp="1" noChangeAspect="1"/>
+          </p:cNvPicPr>
           <p:nvPr>
             <p:ph idx="1"/>
           </p:nvPr>
-        </p:nvSpPr>
-        <p:spPr/>
-        <p:txBody>
-          <a:bodyPr/>
-          <a:lstStyle/>
-          <a:p>
-            <a:r>
-              <a:rPr lang="en-US" dirty="0" smtClean="0"/>
-              <a:t>Screenshot of CoreOS and Ubuntu + Docker</a:t>
-            </a:r>
-            <a:endParaRPr lang="en-US" dirty="0"/>
-          </a:p>
-        </p:txBody>
-      </p:sp>
+        </p:nvPicPr>
+        <p:blipFill>
+          <a:blip r:embed="rId2"/>
+          <a:stretch>
+            <a:fillRect/>
+          </a:stretch>
+        </p:blipFill>
+        <p:spPr>
+          <a:xfrm>
+            <a:off x="2548086" y="2240280"/>
+            <a:ext cx="9482257" cy="4351338"/>
+          </a:xfrm>
+          <a:prstGeom prst="rect">
+            <a:avLst/>
+          </a:prstGeom>
+        </p:spPr>
+      </p:pic>
+      <p:pic>
+        <p:nvPicPr>
+          <p:cNvPr id="4" name="Picture 3"/>
+          <p:cNvPicPr>
+            <a:picLocks noChangeAspect="1"/>
+          </p:cNvPicPr>
+          <p:nvPr/>
+        </p:nvPicPr>
+        <p:blipFill>
+          <a:blip r:embed="rId3"/>
+          <a:stretch>
+            <a:fillRect/>
+          </a:stretch>
+        </p:blipFill>
+        <p:spPr>
+          <a:xfrm>
+            <a:off x="0" y="0"/>
+            <a:ext cx="9661591" cy="4480560"/>
+          </a:xfrm>
+          <a:prstGeom prst="rect">
+            <a:avLst/>
+          </a:prstGeom>
+        </p:spPr>
+      </p:pic>
     </p:spTree>
     <p:extLst>
       <p:ext uri="{BB962C8B-B14F-4D97-AF65-F5344CB8AC3E}">
@@ -9036,6 +9630,81 @@
   <p:clrMapOvr>
     <a:masterClrMapping/>
   </p:clrMapOvr>
+  <p:timing>
+    <p:tnLst>
+      <p:par>
+        <p:cTn id="1" dur="indefinite" restart="never" nodeType="tmRoot">
+          <p:childTnLst>
+            <p:seq concurrent="1" nextAc="seek">
+              <p:cTn id="2" dur="indefinite" nodeType="mainSeq">
+                <p:childTnLst>
+                  <p:par>
+                    <p:cTn id="3" fill="hold">
+                      <p:stCondLst>
+                        <p:cond delay="indefinite"/>
+                      </p:stCondLst>
+                      <p:childTnLst>
+                        <p:par>
+                          <p:cTn id="4" fill="hold">
+                            <p:stCondLst>
+                              <p:cond delay="0"/>
+                            </p:stCondLst>
+                            <p:childTnLst>
+                              <p:par>
+                                <p:cTn id="5" presetID="1" presetClass="entr" presetSubtype="0" fill="hold" nodeType="clickEffect">
+                                  <p:stCondLst>
+                                    <p:cond delay="0"/>
+                                  </p:stCondLst>
+                                  <p:childTnLst>
+                                    <p:set>
+                                      <p:cBhvr>
+                                        <p:cTn id="6" dur="1" fill="hold">
+                                          <p:stCondLst>
+                                            <p:cond delay="0"/>
+                                          </p:stCondLst>
+                                        </p:cTn>
+                                        <p:tgtEl>
+                                          <p:spTgt spid="5"/>
+                                        </p:tgtEl>
+                                        <p:attrNameLst>
+                                          <p:attrName>style.visibility</p:attrName>
+                                        </p:attrNameLst>
+                                      </p:cBhvr>
+                                      <p:to>
+                                        <p:strVal val="visible"/>
+                                      </p:to>
+                                    </p:set>
+                                  </p:childTnLst>
+                                </p:cTn>
+                              </p:par>
+                            </p:childTnLst>
+                          </p:cTn>
+                        </p:par>
+                      </p:childTnLst>
+                    </p:cTn>
+                  </p:par>
+                </p:childTnLst>
+              </p:cTn>
+              <p:prevCondLst>
+                <p:cond evt="onPrev" delay="0">
+                  <p:tgtEl>
+                    <p:sldTgt/>
+                  </p:tgtEl>
+                </p:cond>
+              </p:prevCondLst>
+              <p:nextCondLst>
+                <p:cond evt="onNext" delay="0">
+                  <p:tgtEl>
+                    <p:sldTgt/>
+                  </p:tgtEl>
+                </p:cond>
+              </p:nextCondLst>
+            </p:seq>
+          </p:childTnLst>
+        </p:cTn>
+      </p:par>
+    </p:tnLst>
+  </p:timing>
 </p:sld>
 </file>
 

</xml_diff>

<commit_message>
some minor tweaks to slide wording
</commit_message>
<xml_diff>
--- a/docs/tutorial.pptx
+++ b/docs/tutorial.pptx
@@ -5,7 +5,7 @@
     <p:sldMasterId id="2147483648" r:id="rId1"/>
   </p:sldMasterIdLst>
   <p:notesMasterIdLst>
-    <p:notesMasterId r:id="rId24"/>
+    <p:notesMasterId r:id="rId25"/>
   </p:notesMasterIdLst>
   <p:sldIdLst>
     <p:sldId id="256" r:id="rId2"/>
@@ -26,10 +26,11 @@
     <p:sldId id="270" r:id="rId17"/>
     <p:sldId id="277" r:id="rId18"/>
     <p:sldId id="272" r:id="rId19"/>
-    <p:sldId id="275" r:id="rId20"/>
-    <p:sldId id="278" r:id="rId21"/>
-    <p:sldId id="276" r:id="rId22"/>
-    <p:sldId id="279" r:id="rId23"/>
+    <p:sldId id="280" r:id="rId20"/>
+    <p:sldId id="275" r:id="rId21"/>
+    <p:sldId id="278" r:id="rId22"/>
+    <p:sldId id="276" r:id="rId23"/>
+    <p:sldId id="279" r:id="rId24"/>
   </p:sldIdLst>
   <p:sldSz cx="12192000" cy="6858000"/>
   <p:notesSz cx="6858000" cy="9144000"/>
@@ -151,6 +152,7 @@
             <p14:sldId id="270"/>
             <p14:sldId id="277"/>
             <p14:sldId id="272"/>
+            <p14:sldId id="280"/>
             <p14:sldId id="275"/>
             <p14:sldId id="278"/>
             <p14:sldId id="276"/>
@@ -3805,11 +3807,7 @@
           <a:p>
             <a:r>
               <a:rPr lang="en-US" dirty="0" smtClean="0"/>
-              <a:t>Get to Work </a:t>
-            </a:r>
-            <a:r>
-              <a:rPr lang="en-US" dirty="0" smtClean="0"/>
-              <a:t>Time</a:t>
+              <a:t>Lets Get to Work</a:t>
             </a:r>
             <a:endParaRPr lang="en-US" dirty="0"/>
           </a:p>
@@ -4115,6 +4113,13 @@
   <p:clrMapOvr>
     <a:masterClrMapping/>
   </p:clrMapOvr>
+  <p:timing>
+    <p:tnLst>
+      <p:par>
+        <p:cTn id="1" dur="indefinite" restart="never" nodeType="tmRoot"/>
+      </p:par>
+    </p:tnLst>
+  </p:timing>
 </p:sld>
 </file>
 
@@ -4278,6 +4283,13 @@
   <p:clrMapOvr>
     <a:masterClrMapping/>
   </p:clrMapOvr>
+  <p:timing>
+    <p:tnLst>
+      <p:par>
+        <p:cTn id="1" dur="indefinite" restart="never" nodeType="tmRoot"/>
+      </p:par>
+    </p:tnLst>
+  </p:timing>
 </p:sld>
 </file>
 
@@ -4406,6 +4418,13 @@
   <p:clrMapOvr>
     <a:masterClrMapping/>
   </p:clrMapOvr>
+  <p:timing>
+    <p:tnLst>
+      <p:par>
+        <p:cTn id="1" dur="indefinite" restart="never" nodeType="tmRoot"/>
+      </p:par>
+    </p:tnLst>
+  </p:timing>
 </p:sld>
 </file>
 
@@ -4517,6 +4536,13 @@
   <p:clrMapOvr>
     <a:masterClrMapping/>
   </p:clrMapOvr>
+  <p:timing>
+    <p:tnLst>
+      <p:par>
+        <p:cTn id="1" dur="indefinite" restart="never" nodeType="tmRoot"/>
+      </p:par>
+    </p:tnLst>
+  </p:timing>
 </p:sld>
 </file>
 
@@ -4631,6 +4657,13 @@
   <p:clrMapOvr>
     <a:masterClrMapping/>
   </p:clrMapOvr>
+  <p:timing>
+    <p:tnLst>
+      <p:par>
+        <p:cTn id="1" dur="indefinite" restart="never" nodeType="tmRoot"/>
+      </p:par>
+    </p:tnLst>
+  </p:timing>
 </p:sld>
 </file>
 
@@ -4912,6 +4945,13 @@
   <p:clrMapOvr>
     <a:masterClrMapping/>
   </p:clrMapOvr>
+  <p:timing>
+    <p:tnLst>
+      <p:par>
+        <p:cTn id="1" dur="indefinite" restart="never" nodeType="tmRoot"/>
+      </p:par>
+    </p:tnLst>
+  </p:timing>
 </p:sld>
 </file>
 
@@ -4934,7 +4974,7 @@
       </p:grpSpPr>
       <p:sp>
         <p:nvSpPr>
-          <p:cNvPr id="2" name="Title 1"/>
+          <p:cNvPr id="4" name="Title 3"/>
           <p:cNvSpPr>
             <a:spLocks noGrp="1"/>
           </p:cNvSpPr>
@@ -4949,7 +4989,7 @@
           <a:p>
             <a:r>
               <a:rPr lang="en-US" dirty="0" smtClean="0"/>
-              <a:t>Build and deploy on Azure host</a:t>
+              <a:t>Now for the real stuff…</a:t>
             </a:r>
             <a:endParaRPr lang="en-US" dirty="0"/>
           </a:p>
@@ -4957,189 +4997,48 @@
       </p:sp>
       <p:sp>
         <p:nvSpPr>
-          <p:cNvPr id="3" name="Content Placeholder 2"/>
-          <p:cNvSpPr>
-            <a:spLocks noGrp="1"/>
-          </p:cNvSpPr>
-          <p:nvPr>
-            <p:ph idx="1"/>
+          <p:cNvPr id="5" name="Text Placeholder 4"/>
+          <p:cNvSpPr>
+            <a:spLocks noGrp="1"/>
+          </p:cNvSpPr>
+          <p:nvPr>
+            <p:ph type="body" idx="1"/>
           </p:nvPr>
         </p:nvSpPr>
         <p:spPr/>
         <p:txBody>
-          <a:bodyPr>
-            <a:normAutofit fontScale="85000" lnSpcReduction="20000"/>
-          </a:bodyPr>
+          <a:bodyPr/>
           <a:lstStyle/>
           <a:p>
             <a:r>
               <a:rPr lang="en-US" dirty="0" smtClean="0"/>
-              <a:t>‘</a:t>
-            </a:r>
-            <a:r>
-              <a:rPr lang="en-US" dirty="0" err="1" smtClean="0"/>
-              <a:t>docker</a:t>
-            </a:r>
-            <a:r>
-              <a:rPr lang="en-US" dirty="0" smtClean="0"/>
-              <a:t>-machine create -d azure --azure-location="Central US" --azure-subscription-id="AZURE_SUBSCRIPTION_ID" --azure-subscription-cert="</a:t>
-            </a:r>
-            <a:r>
-              <a:rPr lang="en-US" dirty="0" err="1" smtClean="0"/>
-              <a:t>mycert.pem</a:t>
-            </a:r>
-            <a:r>
-              <a:rPr lang="en-US" dirty="0" smtClean="0"/>
-              <a:t>" </a:t>
-            </a:r>
-            <a:r>
-              <a:rPr lang="en-US" dirty="0" smtClean="0"/>
-              <a:t>MACHINE_NAME’</a:t>
-            </a:r>
-            <a:endParaRPr lang="en-US" dirty="0" smtClean="0"/>
-          </a:p>
-          <a:p>
-            <a:pPr lvl="1"/>
-            <a:r>
-              <a:rPr lang="en-US" dirty="0" smtClean="0"/>
-              <a:t>Replace AZURE_SUBSCRIPTION_ID with the subscription ID retrieved from the Azure </a:t>
-            </a:r>
-            <a:r>
-              <a:rPr lang="en-US" dirty="0" smtClean="0"/>
-              <a:t>portal</a:t>
-            </a:r>
-          </a:p>
-          <a:p>
-            <a:pPr lvl="1"/>
-            <a:r>
-              <a:rPr lang="en-US" dirty="0" smtClean="0"/>
-              <a:t>Replace MACHINE_NAME with whatever you used for STAGE_MACHINE_NAME in config.sh</a:t>
-            </a:r>
-            <a:endParaRPr lang="en-US" dirty="0" smtClean="0"/>
-          </a:p>
-          <a:p>
-            <a:pPr lvl="1"/>
-            <a:endParaRPr lang="en-US" dirty="0" smtClean="0"/>
-          </a:p>
-          <a:p>
-            <a:r>
-              <a:rPr lang="en-US" dirty="0" smtClean="0"/>
-              <a:t>‘</a:t>
-            </a:r>
-            <a:r>
-              <a:rPr lang="en-US" dirty="0" err="1" smtClean="0"/>
-              <a:t>eval</a:t>
-            </a:r>
-            <a:r>
-              <a:rPr lang="en-US" dirty="0" smtClean="0"/>
-              <a:t> “$(</a:t>
-            </a:r>
-            <a:r>
-              <a:rPr lang="en-US" dirty="0" err="1" smtClean="0"/>
-              <a:t>docker</a:t>
-            </a:r>
-            <a:r>
-              <a:rPr lang="en-US" dirty="0" smtClean="0"/>
-              <a:t>-machine </a:t>
-            </a:r>
-            <a:r>
-              <a:rPr lang="en-US" dirty="0" err="1" smtClean="0"/>
-              <a:t>env</a:t>
-            </a:r>
-            <a:r>
-              <a:rPr lang="en-US" dirty="0" smtClean="0"/>
-              <a:t> </a:t>
-            </a:r>
-            <a:r>
-              <a:rPr lang="en-US" dirty="0" smtClean="0"/>
-              <a:t>MACHINE_NAME)”’</a:t>
-            </a:r>
-          </a:p>
-          <a:p>
-            <a:pPr marL="0" indent="0">
-              <a:buNone/>
-            </a:pPr>
-            <a:endParaRPr lang="en-US" dirty="0" smtClean="0"/>
-          </a:p>
-          <a:p>
-            <a:r>
-              <a:rPr lang="en-US" dirty="0" smtClean="0"/>
-              <a:t>‘</a:t>
-            </a:r>
-            <a:r>
-              <a:rPr lang="en-US" dirty="0" smtClean="0"/>
-              <a:t>scripts/stage.sh</a:t>
-            </a:r>
-            <a:r>
-              <a:rPr lang="en-US" dirty="0" smtClean="0"/>
-              <a:t>’</a:t>
-            </a:r>
-            <a:endParaRPr lang="en-US" dirty="0" smtClean="0"/>
-          </a:p>
-          <a:p>
-            <a:pPr marL="0" indent="0">
-              <a:buNone/>
-            </a:pPr>
-            <a:endParaRPr lang="en-US" dirty="0" smtClean="0"/>
-          </a:p>
-          <a:p>
-            <a:r>
-              <a:rPr lang="en-US" dirty="0" smtClean="0"/>
-              <a:t>Open necessary ports on Azure VM (via </a:t>
-            </a:r>
-            <a:r>
-              <a:rPr lang="en-US" dirty="0" smtClean="0">
-                <a:hlinkClick r:id="rId2"/>
-              </a:rPr>
-              <a:t>http://manage.windowsazure.com</a:t>
-            </a:r>
-            <a:r>
-              <a:rPr lang="en-US" dirty="0" smtClean="0"/>
-              <a:t>)</a:t>
-            </a:r>
-          </a:p>
-          <a:p>
-            <a:pPr lvl="1"/>
-            <a:r>
-              <a:rPr lang="en-US" dirty="0" smtClean="0"/>
-              <a:t>80:80 </a:t>
-            </a:r>
-            <a:r>
-              <a:rPr lang="en-US" dirty="0" smtClean="0"/>
-              <a:t>for </a:t>
-            </a:r>
-            <a:r>
-              <a:rPr lang="en-US" dirty="0" smtClean="0"/>
-              <a:t>the </a:t>
-            </a:r>
-            <a:r>
-              <a:rPr lang="en-US" dirty="0" smtClean="0"/>
-              <a:t>Web interface</a:t>
-            </a:r>
-          </a:p>
-          <a:p>
-            <a:pPr lvl="1"/>
-            <a:r>
-              <a:rPr lang="en-US" dirty="0" smtClean="0"/>
-              <a:t>5050:5050 </a:t>
-            </a:r>
-            <a:r>
-              <a:rPr lang="en-US" dirty="0" smtClean="0"/>
-              <a:t>for the REST API (optional)</a:t>
-            </a:r>
+              <a:t>It’s just Docker all </a:t>
+            </a:r>
+            <a:r>
+              <a:rPr lang="en-US" smtClean="0"/>
+              <a:t>the way down</a:t>
+            </a:r>
+            <a:endParaRPr lang="en-US" dirty="0"/>
           </a:p>
         </p:txBody>
       </p:sp>
     </p:spTree>
     <p:extLst>
       <p:ext uri="{BB962C8B-B14F-4D97-AF65-F5344CB8AC3E}">
-        <p14:creationId xmlns:p14="http://schemas.microsoft.com/office/powerpoint/2010/main" val="2191458425"/>
+        <p14:creationId xmlns:p14="http://schemas.microsoft.com/office/powerpoint/2010/main" val="748906377"/>
       </p:ext>
     </p:extLst>
   </p:cSld>
   <p:clrMapOvr>
     <a:masterClrMapping/>
   </p:clrMapOvr>
+  <p:timing>
+    <p:tnLst>
+      <p:par>
+        <p:cTn id="1" dur="indefinite" restart="never" nodeType="tmRoot"/>
+      </p:par>
+    </p:tnLst>
+  </p:timing>
 </p:sld>
 </file>
 
@@ -5337,6 +5236,13 @@
   <p:clrMapOvr>
     <a:masterClrMapping/>
   </p:clrMapOvr>
+  <p:timing>
+    <p:tnLst>
+      <p:par>
+        <p:cTn id="1" dur="indefinite" restart="never" nodeType="tmRoot"/>
+      </p:par>
+    </p:tnLst>
+  </p:timing>
 </p:sld>
 </file>
 
@@ -5372,7 +5278,11 @@
           <a:bodyPr/>
           <a:lstStyle/>
           <a:p>
-            <a:endParaRPr lang="en-US"/>
+            <a:r>
+              <a:rPr lang="en-US" dirty="0" smtClean="0"/>
+              <a:t>Build and deploy on Azure host</a:t>
+            </a:r>
+            <a:endParaRPr lang="en-US" dirty="0"/>
           </a:p>
         </p:txBody>
       </p:sp>
@@ -5388,48 +5298,92 @@
         </p:nvSpPr>
         <p:spPr/>
         <p:txBody>
-          <a:bodyPr/>
+          <a:bodyPr>
+            <a:normAutofit fontScale="85000" lnSpcReduction="20000"/>
+          </a:bodyPr>
           <a:lstStyle/>
           <a:p>
             <a:r>
-              <a:rPr lang="en-US" dirty="0"/>
-              <a:t>REST </a:t>
-            </a:r>
-            <a:r>
-              <a:rPr lang="en-US" dirty="0" smtClean="0"/>
-              <a:t>API</a:t>
-            </a:r>
-          </a:p>
-          <a:p>
-            <a:pPr marL="457200" lvl="1" indent="0">
-              <a:buNone/>
-            </a:pPr>
-            <a:endParaRPr lang="en-US" dirty="0" smtClean="0">
-              <a:hlinkClick r:id="rId2"/>
-            </a:endParaRPr>
-          </a:p>
-          <a:p>
-            <a:pPr marL="457200" lvl="1" indent="0">
-              <a:buNone/>
-            </a:pPr>
-            <a:r>
-              <a:rPr lang="en-US" dirty="0" smtClean="0">
-                <a:hlinkClick r:id="rId2"/>
-              </a:rPr>
-              <a:t>http://MACHINE_NAME.cloudapp.net:5050/JerseyHelloWorld/rest/helloworld</a:t>
+              <a:rPr lang="en-US" dirty="0" smtClean="0"/>
+              <a:t>‘</a:t>
+            </a:r>
+            <a:r>
+              <a:rPr lang="en-US" dirty="0" err="1" smtClean="0"/>
+              <a:t>docker</a:t>
+            </a:r>
+            <a:r>
+              <a:rPr lang="en-US" dirty="0" smtClean="0"/>
+              <a:t>-machine create -d azure --azure-location="Central US" --azure-subscription-id="AZURE_SUBSCRIPTION_ID" --azure-subscription-cert="</a:t>
+            </a:r>
+            <a:r>
+              <a:rPr lang="en-US" dirty="0" err="1" smtClean="0"/>
+              <a:t>mycert.pem</a:t>
+            </a:r>
+            <a:r>
+              <a:rPr lang="en-US" dirty="0" smtClean="0"/>
+              <a:t>" </a:t>
+            </a:r>
+            <a:r>
+              <a:rPr lang="en-US" dirty="0" smtClean="0"/>
+              <a:t>MACHINE_NAME’</a:t>
             </a:r>
             <a:endParaRPr lang="en-US" dirty="0" smtClean="0"/>
           </a:p>
           <a:p>
-            <a:pPr marL="457200" lvl="1" indent="0">
-              <a:buNone/>
-            </a:pPr>
-            <a:endParaRPr lang="en-US" dirty="0"/>
-          </a:p>
-          <a:p>
-            <a:r>
-              <a:rPr lang="en-US" dirty="0" smtClean="0"/>
-              <a:t>Web</a:t>
+            <a:pPr lvl="1"/>
+            <a:r>
+              <a:rPr lang="en-US" dirty="0" smtClean="0"/>
+              <a:t>Replace AZURE_SUBSCRIPTION_ID with the subscription ID retrieved from the Azure </a:t>
+            </a:r>
+            <a:r>
+              <a:rPr lang="en-US" dirty="0" smtClean="0"/>
+              <a:t>portal</a:t>
+            </a:r>
+          </a:p>
+          <a:p>
+            <a:pPr lvl="1"/>
+            <a:r>
+              <a:rPr lang="en-US" dirty="0" smtClean="0"/>
+              <a:t>Replace MACHINE_NAME with whatever you used for STAGE_MACHINE_NAME in config.sh</a:t>
+            </a:r>
+            <a:endParaRPr lang="en-US" dirty="0" smtClean="0"/>
+          </a:p>
+          <a:p>
+            <a:pPr lvl="1"/>
+            <a:endParaRPr lang="en-US" dirty="0" smtClean="0"/>
+          </a:p>
+          <a:p>
+            <a:r>
+              <a:rPr lang="en-US" dirty="0" smtClean="0"/>
+              <a:t>‘</a:t>
+            </a:r>
+            <a:r>
+              <a:rPr lang="en-US" dirty="0" err="1" smtClean="0"/>
+              <a:t>eval</a:t>
+            </a:r>
+            <a:r>
+              <a:rPr lang="en-US" dirty="0" smtClean="0"/>
+              <a:t> “$(</a:t>
+            </a:r>
+            <a:r>
+              <a:rPr lang="en-US" dirty="0" err="1" smtClean="0"/>
+              <a:t>docker</a:t>
+            </a:r>
+            <a:r>
+              <a:rPr lang="en-US" dirty="0" smtClean="0"/>
+              <a:t>-machine </a:t>
+            </a:r>
+            <a:r>
+              <a:rPr lang="en-US" dirty="0" err="1" smtClean="0"/>
+              <a:t>env</a:t>
+            </a:r>
+            <a:r>
+              <a:rPr lang="en-US" dirty="0" smtClean="0"/>
+              <a:t> </a:t>
+            </a:r>
+            <a:r>
+              <a:rPr lang="en-US" dirty="0" smtClean="0"/>
+              <a:t>MACHINE_NAME)”’</a:t>
             </a:r>
           </a:p>
           <a:p>
@@ -5439,35 +5393,91 @@
             <a:endParaRPr lang="en-US" dirty="0" smtClean="0"/>
           </a:p>
           <a:p>
-            <a:pPr marL="457200" lvl="1" indent="0">
+            <a:r>
+              <a:rPr lang="en-US" dirty="0" smtClean="0"/>
+              <a:t>‘</a:t>
+            </a:r>
+            <a:r>
+              <a:rPr lang="en-US" dirty="0" smtClean="0"/>
+              <a:t>scripts/stage.sh</a:t>
+            </a:r>
+            <a:r>
+              <a:rPr lang="en-US" dirty="0" smtClean="0"/>
+              <a:t>’</a:t>
+            </a:r>
+            <a:endParaRPr lang="en-US" dirty="0" smtClean="0"/>
+          </a:p>
+          <a:p>
+            <a:pPr marL="0" indent="0">
               <a:buNone/>
             </a:pPr>
+            <a:endParaRPr lang="en-US" dirty="0" smtClean="0"/>
+          </a:p>
+          <a:p>
+            <a:r>
+              <a:rPr lang="en-US" dirty="0" smtClean="0"/>
+              <a:t>Open necessary ports on Azure VM (via </a:t>
+            </a:r>
             <a:r>
               <a:rPr lang="en-US" dirty="0" smtClean="0">
-                <a:hlinkClick r:id="rId3"/>
+                <a:hlinkClick r:id="rId2"/>
               </a:rPr>
-              <a:t>http://MACHINE_NAME.cloudapp.net</a:t>
-            </a:r>
-            <a:r>
-              <a:rPr lang="en-US" dirty="0">
-                <a:hlinkClick r:id="rId3"/>
-              </a:rPr>
-              <a:t>/</a:t>
-            </a:r>
-            <a:endParaRPr lang="en-US" dirty="0"/>
+              <a:t>http://manage.windowsazure.com</a:t>
+            </a:r>
+            <a:r>
+              <a:rPr lang="en-US" dirty="0" smtClean="0"/>
+              <a:t>)</a:t>
+            </a:r>
+          </a:p>
+          <a:p>
+            <a:pPr lvl="1"/>
+            <a:r>
+              <a:rPr lang="en-US" dirty="0" smtClean="0"/>
+              <a:t>80:80 </a:t>
+            </a:r>
+            <a:r>
+              <a:rPr lang="en-US" dirty="0" smtClean="0"/>
+              <a:t>for </a:t>
+            </a:r>
+            <a:r>
+              <a:rPr lang="en-US" dirty="0" smtClean="0"/>
+              <a:t>the </a:t>
+            </a:r>
+            <a:r>
+              <a:rPr lang="en-US" dirty="0" smtClean="0"/>
+              <a:t>Web interface</a:t>
+            </a:r>
+          </a:p>
+          <a:p>
+            <a:pPr lvl="1"/>
+            <a:r>
+              <a:rPr lang="en-US" dirty="0" smtClean="0"/>
+              <a:t>5050:5050 </a:t>
+            </a:r>
+            <a:r>
+              <a:rPr lang="en-US" dirty="0" smtClean="0"/>
+              <a:t>for the REST API (optional)</a:t>
+            </a:r>
           </a:p>
         </p:txBody>
       </p:sp>
     </p:spTree>
     <p:extLst>
       <p:ext uri="{BB962C8B-B14F-4D97-AF65-F5344CB8AC3E}">
-        <p14:creationId xmlns:p14="http://schemas.microsoft.com/office/powerpoint/2010/main" val="1135983599"/>
+        <p14:creationId xmlns:p14="http://schemas.microsoft.com/office/powerpoint/2010/main" val="2191458425"/>
       </p:ext>
     </p:extLst>
   </p:cSld>
   <p:clrMapOvr>
     <a:masterClrMapping/>
   </p:clrMapOvr>
+  <p:timing>
+    <p:tnLst>
+      <p:par>
+        <p:cTn id="1" dur="indefinite" restart="never" nodeType="tmRoot"/>
+      </p:par>
+    </p:tnLst>
+  </p:timing>
 </p:sld>
 </file>
 
@@ -5503,11 +5513,7 @@
           <a:bodyPr/>
           <a:lstStyle/>
           <a:p>
-            <a:r>
-              <a:rPr lang="en-US" dirty="0" smtClean="0"/>
-              <a:t>Build and Run the Application on Client</a:t>
-            </a:r>
-            <a:endParaRPr lang="en-US" dirty="0"/>
+            <a:endParaRPr lang="en-US"/>
           </a:p>
         </p:txBody>
       </p:sp>
@@ -5521,79 +5527,42 @@
             <p:ph idx="1"/>
           </p:nvPr>
         </p:nvSpPr>
-        <p:spPr>
-          <a:xfrm>
-            <a:off x="838200" y="1794803"/>
-            <a:ext cx="10515600" cy="4351338"/>
-          </a:xfrm>
-        </p:spPr>
-        <p:txBody>
-          <a:bodyPr>
-            <a:normAutofit/>
-          </a:bodyPr>
+        <p:spPr/>
+        <p:txBody>
+          <a:bodyPr/>
           <a:lstStyle/>
           <a:p>
             <a:r>
-              <a:rPr lang="en-US" dirty="0" smtClean="0"/>
-              <a:t>‘</a:t>
-            </a:r>
-            <a:r>
-              <a:rPr lang="en-US" dirty="0" err="1" smtClean="0"/>
-              <a:t>docker</a:t>
-            </a:r>
-            <a:r>
-              <a:rPr lang="en-US" dirty="0" smtClean="0"/>
-              <a:t>-machine create -d hyper-v dev’</a:t>
-            </a:r>
-          </a:p>
-          <a:p>
-            <a:pPr lvl="1"/>
-            <a:r>
-              <a:rPr lang="en-US" dirty="0" smtClean="0"/>
-              <a:t>Must be run as an </a:t>
-            </a:r>
-            <a:r>
-              <a:rPr lang="en-US" dirty="0" smtClean="0"/>
-              <a:t>Administrator</a:t>
+              <a:rPr lang="en-US" dirty="0"/>
+              <a:t>REST </a:t>
+            </a:r>
+            <a:r>
+              <a:rPr lang="en-US" dirty="0" smtClean="0"/>
+              <a:t>API</a:t>
+            </a:r>
+          </a:p>
+          <a:p>
+            <a:pPr marL="457200" lvl="1" indent="0">
+              <a:buNone/>
+            </a:pPr>
+            <a:endParaRPr lang="en-US" dirty="0" smtClean="0">
+              <a:hlinkClick r:id="rId2"/>
+            </a:endParaRPr>
+          </a:p>
+          <a:p>
+            <a:pPr marL="457200" lvl="1" indent="0">
+              <a:buNone/>
+            </a:pPr>
+            <a:r>
+              <a:rPr lang="en-US" dirty="0" smtClean="0">
+                <a:hlinkClick r:id="rId2"/>
+              </a:rPr>
+              <a:t>http://MACHINE_NAME.cloudapp.net:5050/JerseyHelloWorld/rest/helloworld</a:t>
             </a:r>
             <a:endParaRPr lang="en-US" dirty="0" smtClean="0"/>
           </a:p>
           <a:p>
-            <a:pPr lvl="1"/>
-            <a:endParaRPr lang="en-US" dirty="0"/>
-          </a:p>
-          <a:p>
-            <a:r>
-              <a:rPr lang="en-US" dirty="0" smtClean="0"/>
-              <a:t>‘</a:t>
-            </a:r>
-            <a:r>
-              <a:rPr lang="en-US" dirty="0" err="1" smtClean="0"/>
-              <a:t>eval</a:t>
-            </a:r>
-            <a:r>
-              <a:rPr lang="en-US" dirty="0" smtClean="0"/>
-              <a:t> “$(</a:t>
-            </a:r>
-            <a:r>
-              <a:rPr lang="en-US" dirty="0" err="1" smtClean="0"/>
-              <a:t>docker</a:t>
-            </a:r>
-            <a:r>
-              <a:rPr lang="en-US" dirty="0" smtClean="0"/>
-              <a:t>-machine </a:t>
-            </a:r>
-            <a:r>
-              <a:rPr lang="en-US" dirty="0" err="1" smtClean="0"/>
-              <a:t>env</a:t>
-            </a:r>
-            <a:r>
-              <a:rPr lang="en-US" dirty="0" smtClean="0"/>
-              <a:t> dev)”’</a:t>
-            </a:r>
-          </a:p>
-          <a:p>
-            <a:pPr marL="914400" lvl="2" indent="0">
+            <a:pPr marL="457200" lvl="1" indent="0">
               <a:buNone/>
             </a:pPr>
             <a:endParaRPr lang="en-US" dirty="0"/>
@@ -5601,20 +5570,31 @@
           <a:p>
             <a:r>
               <a:rPr lang="en-US" dirty="0" smtClean="0"/>
-              <a:t>Run ‘scripts/dev.sh’</a:t>
-            </a:r>
-          </a:p>
-          <a:p>
-            <a:pPr lvl="1"/>
-            <a:r>
-              <a:rPr lang="en-US" dirty="0" smtClean="0"/>
-              <a:t>Will build and run both containers on your dev client</a:t>
-            </a:r>
-          </a:p>
-          <a:p>
+              <a:t>Web</a:t>
+            </a:r>
+          </a:p>
+          <a:p>
+            <a:pPr marL="0" indent="0">
+              <a:buNone/>
+            </a:pPr>
             <a:endParaRPr lang="en-US" dirty="0" smtClean="0"/>
           </a:p>
           <a:p>
+            <a:pPr marL="457200" lvl="1" indent="0">
+              <a:buNone/>
+            </a:pPr>
+            <a:r>
+              <a:rPr lang="en-US" dirty="0" smtClean="0">
+                <a:hlinkClick r:id="rId3"/>
+              </a:rPr>
+              <a:t>http://MACHINE_NAME.cloudapp.net</a:t>
+            </a:r>
+            <a:r>
+              <a:rPr lang="en-US" dirty="0">
+                <a:hlinkClick r:id="rId3"/>
+              </a:rPr>
+              <a:t>/</a:t>
+            </a:r>
             <a:endParaRPr lang="en-US" dirty="0"/>
           </a:p>
         </p:txBody>
@@ -5622,7 +5602,7 @@
     </p:spTree>
     <p:extLst>
       <p:ext uri="{BB962C8B-B14F-4D97-AF65-F5344CB8AC3E}">
-        <p14:creationId xmlns:p14="http://schemas.microsoft.com/office/powerpoint/2010/main" val="409503179"/>
+        <p14:creationId xmlns:p14="http://schemas.microsoft.com/office/powerpoint/2010/main" val="1135983599"/>
       </p:ext>
     </p:extLst>
   </p:cSld>
@@ -5673,7 +5653,7 @@
           <a:p>
             <a:r>
               <a:rPr lang="en-US" dirty="0" smtClean="0"/>
-              <a:t>Pointers</a:t>
+              <a:t>Build and Run the Application on Client</a:t>
             </a:r>
             <a:endParaRPr lang="en-US" dirty="0"/>
           </a:p>
@@ -5687,6 +5667,151 @@
           </p:cNvSpPr>
           <p:nvPr>
             <p:ph idx="1"/>
+          </p:nvPr>
+        </p:nvSpPr>
+        <p:spPr>
+          <a:xfrm>
+            <a:off x="838200" y="1794803"/>
+            <a:ext cx="10515600" cy="4351338"/>
+          </a:xfrm>
+        </p:spPr>
+        <p:txBody>
+          <a:bodyPr>
+            <a:normAutofit/>
+          </a:bodyPr>
+          <a:lstStyle/>
+          <a:p>
+            <a:r>
+              <a:rPr lang="en-US" dirty="0" smtClean="0"/>
+              <a:t>‘</a:t>
+            </a:r>
+            <a:r>
+              <a:rPr lang="en-US" dirty="0" err="1" smtClean="0"/>
+              <a:t>docker</a:t>
+            </a:r>
+            <a:r>
+              <a:rPr lang="en-US" dirty="0" smtClean="0"/>
+              <a:t>-machine create -d hyper-v dev’</a:t>
+            </a:r>
+          </a:p>
+          <a:p>
+            <a:pPr lvl="1"/>
+            <a:r>
+              <a:rPr lang="en-US" dirty="0" smtClean="0"/>
+              <a:t>Must be run as an </a:t>
+            </a:r>
+            <a:r>
+              <a:rPr lang="en-US" dirty="0" smtClean="0"/>
+              <a:t>Administrator</a:t>
+            </a:r>
+            <a:endParaRPr lang="en-US" dirty="0" smtClean="0"/>
+          </a:p>
+          <a:p>
+            <a:pPr lvl="1"/>
+            <a:endParaRPr lang="en-US" dirty="0"/>
+          </a:p>
+          <a:p>
+            <a:r>
+              <a:rPr lang="en-US" dirty="0" smtClean="0"/>
+              <a:t>‘</a:t>
+            </a:r>
+            <a:r>
+              <a:rPr lang="en-US" dirty="0" err="1" smtClean="0"/>
+              <a:t>eval</a:t>
+            </a:r>
+            <a:r>
+              <a:rPr lang="en-US" dirty="0" smtClean="0"/>
+              <a:t> “$(</a:t>
+            </a:r>
+            <a:r>
+              <a:rPr lang="en-US" dirty="0" err="1" smtClean="0"/>
+              <a:t>docker</a:t>
+            </a:r>
+            <a:r>
+              <a:rPr lang="en-US" dirty="0" smtClean="0"/>
+              <a:t>-machine </a:t>
+            </a:r>
+            <a:r>
+              <a:rPr lang="en-US" dirty="0" err="1" smtClean="0"/>
+              <a:t>env</a:t>
+            </a:r>
+            <a:r>
+              <a:rPr lang="en-US" dirty="0" smtClean="0"/>
+              <a:t> dev)”’</a:t>
+            </a:r>
+          </a:p>
+          <a:p>
+            <a:pPr marL="914400" lvl="2" indent="0">
+              <a:buNone/>
+            </a:pPr>
+            <a:endParaRPr lang="en-US" dirty="0"/>
+          </a:p>
+          <a:p>
+            <a:r>
+              <a:rPr lang="en-US" dirty="0" smtClean="0"/>
+              <a:t>Run ‘scripts/dev.sh’</a:t>
+            </a:r>
+          </a:p>
+          <a:p>
+            <a:pPr lvl="1"/>
+            <a:r>
+              <a:rPr lang="en-US" dirty="0" smtClean="0"/>
+              <a:t>Will build and run both containers on your dev client</a:t>
+            </a:r>
+          </a:p>
+          <a:p>
+            <a:endParaRPr lang="en-US" dirty="0" smtClean="0"/>
+          </a:p>
+          <a:p>
+            <a:endParaRPr lang="en-US" dirty="0"/>
+          </a:p>
+        </p:txBody>
+      </p:sp>
+    </p:spTree>
+    <p:extLst>
+      <p:ext uri="{BB962C8B-B14F-4D97-AF65-F5344CB8AC3E}">
+        <p14:creationId xmlns:p14="http://schemas.microsoft.com/office/powerpoint/2010/main" val="409503179"/>
+      </p:ext>
+    </p:extLst>
+  </p:cSld>
+  <p:clrMapOvr>
+    <a:masterClrMapping/>
+  </p:clrMapOvr>
+  <p:timing>
+    <p:tnLst>
+      <p:par>
+        <p:cTn id="1" dur="indefinite" restart="never" nodeType="tmRoot"/>
+      </p:par>
+    </p:tnLst>
+  </p:timing>
+</p:sld>
+</file>
+
+<file path=ppt/slides/slide23.xml><?xml version="1.0" encoding="utf-8"?>
+<p:sld xmlns:a="http://schemas.openxmlformats.org/drawingml/2006/main" xmlns:r="http://schemas.openxmlformats.org/officeDocument/2006/relationships" xmlns:p="http://schemas.openxmlformats.org/presentationml/2006/main">
+  <p:cSld>
+    <p:spTree>
+      <p:nvGrpSpPr>
+        <p:cNvPr id="1" name=""/>
+        <p:cNvGrpSpPr/>
+        <p:nvPr/>
+      </p:nvGrpSpPr>
+      <p:grpSpPr>
+        <a:xfrm>
+          <a:off x="0" y="0"/>
+          <a:ext cx="0" cy="0"/>
+          <a:chOff x="0" y="0"/>
+          <a:chExt cx="0" cy="0"/>
+        </a:xfrm>
+      </p:grpSpPr>
+      <p:sp>
+        <p:nvSpPr>
+          <p:cNvPr id="2" name="Title 1"/>
+          <p:cNvSpPr>
+            <a:spLocks noGrp="1"/>
+          </p:cNvSpPr>
+          <p:nvPr>
+            <p:ph type="title"/>
           </p:nvPr>
         </p:nvSpPr>
         <p:spPr/>
@@ -5696,6 +5821,29 @@
           <a:p>
             <a:r>
               <a:rPr lang="en-US" dirty="0" smtClean="0"/>
+              <a:t>Pointers</a:t>
+            </a:r>
+            <a:endParaRPr lang="en-US" dirty="0"/>
+          </a:p>
+        </p:txBody>
+      </p:sp>
+      <p:sp>
+        <p:nvSpPr>
+          <p:cNvPr id="3" name="Content Placeholder 2"/>
+          <p:cNvSpPr>
+            <a:spLocks noGrp="1"/>
+          </p:cNvSpPr>
+          <p:nvPr>
+            <p:ph idx="1"/>
+          </p:nvPr>
+        </p:nvSpPr>
+        <p:spPr/>
+        <p:txBody>
+          <a:bodyPr/>
+          <a:lstStyle/>
+          <a:p>
+            <a:r>
+              <a:rPr lang="en-US" dirty="0" smtClean="0"/>
               <a:t>environmentSetup.md</a:t>
             </a:r>
           </a:p>
@@ -5745,7 +5893,7 @@
               <a:t>Step by step instructions for starting </a:t>
             </a:r>
             <a:r>
-              <a:rPr lang="en-US" smtClean="0"/>
+              <a:rPr lang="en-US" dirty="0" smtClean="0"/>
               <a:t>an Azure </a:t>
             </a:r>
             <a:r>
@@ -5903,6 +6051,13 @@
   <p:clrMapOvr>
     <a:masterClrMapping/>
   </p:clrMapOvr>
+  <p:timing>
+    <p:tnLst>
+      <p:par>
+        <p:cTn id="1" dur="indefinite" restart="never" nodeType="tmRoot"/>
+      </p:par>
+    </p:tnLst>
+  </p:timing>
 </p:sld>
 </file>
 
@@ -9484,8 +9639,13 @@
           <a:p>
             <a:r>
               <a:rPr lang="en-US" dirty="0" smtClean="0"/>
-              <a:t>Demo of Docker containers on Windows Server</a:t>
-            </a:r>
+              <a:t>Demo of Docker containers on Windows </a:t>
+            </a:r>
+            <a:r>
+              <a:rPr lang="en-US" dirty="0" smtClean="0"/>
+              <a:t>Server at Build in April</a:t>
+            </a:r>
+            <a:endParaRPr lang="en-US" dirty="0" smtClean="0"/>
           </a:p>
           <a:p>
             <a:r>

</xml_diff>

<commit_message>
update Microsoft specific support items
</commit_message>
<xml_diff>
--- a/docs/tutorial.pptx
+++ b/docs/tutorial.pptx
@@ -5012,11 +5012,7 @@
           <a:p>
             <a:r>
               <a:rPr lang="en-US" dirty="0" smtClean="0"/>
-              <a:t>It’s just Docker all </a:t>
-            </a:r>
-            <a:r>
-              <a:rPr lang="en-US" smtClean="0"/>
-              <a:t>the way down</a:t>
+              <a:t>It’s just Docker all the way down</a:t>
             </a:r>
             <a:endParaRPr lang="en-US" dirty="0"/>
           </a:p>
@@ -9422,7 +9418,7 @@
           <a:p>
             <a:r>
               <a:rPr lang="en-US" dirty="0" smtClean="0"/>
-              <a:t>Status</a:t>
+              <a:t>Docker Tooling Status</a:t>
             </a:r>
             <a:endParaRPr lang="en-US" dirty="0"/>
           </a:p>
@@ -9440,7 +9436,9 @@
         </p:nvSpPr>
         <p:spPr/>
         <p:txBody>
-          <a:bodyPr/>
+          <a:bodyPr>
+            <a:normAutofit/>
+          </a:bodyPr>
           <a:lstStyle/>
           <a:p>
             <a:r>
@@ -9553,7 +9551,11 @@
           <a:p>
             <a:r>
               <a:rPr lang="en-US" dirty="0" smtClean="0"/>
-              <a:t>Compose and Swarm</a:t>
+              <a:t>Compose and </a:t>
+            </a:r>
+            <a:r>
+              <a:rPr lang="en-US" dirty="0" smtClean="0"/>
+              <a:t>Swarm</a:t>
             </a:r>
           </a:p>
           <a:p>
@@ -9616,7 +9618,7 @@
           <a:p>
             <a:r>
               <a:rPr lang="en-US" dirty="0" smtClean="0"/>
-              <a:t>Docker and Windows Server</a:t>
+              <a:t>Microsoft Specific Status</a:t>
             </a:r>
             <a:endParaRPr lang="en-US" dirty="0"/>
           </a:p>
@@ -9634,36 +9636,84 @@
         </p:nvSpPr>
         <p:spPr/>
         <p:txBody>
-          <a:bodyPr/>
+          <a:bodyPr>
+            <a:normAutofit fontScale="92500" lnSpcReduction="10000"/>
+          </a:bodyPr>
           <a:lstStyle/>
           <a:p>
             <a:r>
               <a:rPr lang="en-US" dirty="0" smtClean="0"/>
-              <a:t>Demo of Docker containers on Windows </a:t>
-            </a:r>
-            <a:r>
-              <a:rPr lang="en-US" dirty="0" smtClean="0"/>
-              <a:t>Server at Build in April</a:t>
+              <a:t>Windows Server Containers at //build in April</a:t>
+            </a:r>
+          </a:p>
+          <a:p>
+            <a:r>
+              <a:rPr lang="en-US" dirty="0" smtClean="0"/>
+              <a:t>Multi-Platform Containerized application at DockerCon</a:t>
+            </a:r>
+          </a:p>
+          <a:p>
+            <a:r>
+              <a:rPr lang="en-US" dirty="0" smtClean="0"/>
+              <a:t>Docker VM Extension for Linux on Azure</a:t>
             </a:r>
             <a:endParaRPr lang="en-US" dirty="0" smtClean="0"/>
           </a:p>
           <a:p>
             <a:r>
               <a:rPr lang="en-US" dirty="0" smtClean="0"/>
-              <a:t>Docker CLI on Windows</a:t>
-            </a:r>
-          </a:p>
-          <a:p>
-            <a:r>
-              <a:rPr lang="en-US" dirty="0" smtClean="0"/>
-              <a:t>Nano Server</a:t>
-            </a:r>
-          </a:p>
-          <a:p>
-            <a:r>
-              <a:rPr lang="en-US" dirty="0" smtClean="0"/>
               <a:t>Hyper-V Containers</a:t>
             </a:r>
+          </a:p>
+          <a:p>
+            <a:r>
+              <a:rPr lang="en-US" dirty="0"/>
+              <a:t>Visual Studio </a:t>
+            </a:r>
+            <a:r>
+              <a:rPr lang="en-US" dirty="0" smtClean="0"/>
+              <a:t>tooling</a:t>
+            </a:r>
+          </a:p>
+          <a:p>
+            <a:r>
+              <a:rPr lang="en-US" dirty="0" smtClean="0"/>
+              <a:t>Visual Studio Online for CI across multiple containers using Docker Compose</a:t>
+            </a:r>
+          </a:p>
+          <a:p>
+            <a:r>
+              <a:rPr lang="en-US" dirty="0" smtClean="0"/>
+              <a:t>Docker Trusted Registry support in Visual Studio Online</a:t>
+            </a:r>
+          </a:p>
+          <a:p>
+            <a:r>
+              <a:rPr lang="en-US" dirty="0" smtClean="0"/>
+              <a:t>Azure Marketplace integration of </a:t>
+            </a:r>
+            <a:r>
+              <a:rPr lang="en-US" dirty="0"/>
+              <a:t>c</a:t>
+            </a:r>
+            <a:r>
+              <a:rPr lang="en-US" dirty="0" smtClean="0"/>
+              <a:t>ontainerized applications</a:t>
+            </a:r>
+          </a:p>
+          <a:p>
+            <a:r>
+              <a:rPr lang="en-US" dirty="0" smtClean="0"/>
+              <a:t>Docker Marketplace VM for Docker </a:t>
+            </a:r>
+            <a:r>
+              <a:rPr lang="en-US" smtClean="0"/>
+              <a:t>Trusted Registries</a:t>
+            </a:r>
+            <a:endParaRPr lang="en-US" dirty="0"/>
+          </a:p>
+          <a:p>
+            <a:endParaRPr lang="en-US" dirty="0" smtClean="0"/>
           </a:p>
           <a:p>
             <a:endParaRPr lang="en-US" dirty="0"/>
@@ -9732,54 +9782,55 @@
       </p:sp>
       <p:pic>
         <p:nvPicPr>
-          <p:cNvPr id="5" name="Content Placeholder 4"/>
-          <p:cNvPicPr>
-            <a:picLocks noGrp="1" noChangeAspect="1"/>
-          </p:cNvPicPr>
-          <p:nvPr>
-            <p:ph idx="1"/>
-          </p:nvPr>
+          <p:cNvPr id="6" name="Picture 5"/>
+          <p:cNvPicPr/>
+          <p:nvPr/>
         </p:nvPicPr>
         <p:blipFill>
-          <a:blip r:embed="rId2"/>
+          <a:blip r:embed="rId2">
+            <a:extLst>
+              <a:ext uri="{28A0092B-C50C-407E-A947-70E740481C1C}">
+                <a14:useLocalDpi xmlns:a14="http://schemas.microsoft.com/office/drawing/2010/main" val="0"/>
+              </a:ext>
+            </a:extLst>
+          </a:blip>
           <a:stretch>
             <a:fillRect/>
           </a:stretch>
         </p:blipFill>
-        <p:spPr>
+        <p:spPr bwMode="auto">
           <a:xfrm>
-            <a:off x="2548086" y="2240280"/>
-            <a:ext cx="9482257" cy="4351338"/>
+            <a:off x="838200" y="0"/>
+            <a:ext cx="10435119" cy="6858000"/>
           </a:xfrm>
           <a:prstGeom prst="rect">
             <a:avLst/>
           </a:prstGeom>
+          <a:noFill/>
+          <a:ln>
+            <a:noFill/>
+          </a:ln>
         </p:spPr>
       </p:pic>
-      <p:pic>
-        <p:nvPicPr>
-          <p:cNvPr id="4" name="Picture 3"/>
-          <p:cNvPicPr>
-            <a:picLocks noChangeAspect="1"/>
-          </p:cNvPicPr>
-          <p:nvPr/>
-        </p:nvPicPr>
-        <p:blipFill>
-          <a:blip r:embed="rId3"/>
-          <a:stretch>
-            <a:fillRect/>
-          </a:stretch>
-        </p:blipFill>
-        <p:spPr>
-          <a:xfrm>
-            <a:off x="0" y="0"/>
-            <a:ext cx="9661591" cy="4480560"/>
-          </a:xfrm>
-          <a:prstGeom prst="rect">
-            <a:avLst/>
-          </a:prstGeom>
-        </p:spPr>
-      </p:pic>
+      <p:sp>
+        <p:nvSpPr>
+          <p:cNvPr id="7" name="Content Placeholder 6"/>
+          <p:cNvSpPr>
+            <a:spLocks noGrp="1"/>
+          </p:cNvSpPr>
+          <p:nvPr>
+            <p:ph idx="1"/>
+          </p:nvPr>
+        </p:nvSpPr>
+        <p:spPr/>
+        <p:txBody>
+          <a:bodyPr/>
+          <a:lstStyle/>
+          <a:p>
+            <a:endParaRPr lang="en-US"/>
+          </a:p>
+        </p:txBody>
+      </p:sp>
     </p:spTree>
     <p:extLst>
       <p:ext uri="{BB962C8B-B14F-4D97-AF65-F5344CB8AC3E}">
@@ -9793,75 +9844,7 @@
   <p:timing>
     <p:tnLst>
       <p:par>
-        <p:cTn id="1" dur="indefinite" restart="never" nodeType="tmRoot">
-          <p:childTnLst>
-            <p:seq concurrent="1" nextAc="seek">
-              <p:cTn id="2" dur="indefinite" nodeType="mainSeq">
-                <p:childTnLst>
-                  <p:par>
-                    <p:cTn id="3" fill="hold">
-                      <p:stCondLst>
-                        <p:cond delay="indefinite"/>
-                      </p:stCondLst>
-                      <p:childTnLst>
-                        <p:par>
-                          <p:cTn id="4" fill="hold">
-                            <p:stCondLst>
-                              <p:cond delay="0"/>
-                            </p:stCondLst>
-                            <p:childTnLst>
-                              <p:par>
-                                <p:cTn id="5" presetID="1" presetClass="entr" presetSubtype="0" fill="hold" nodeType="clickEffect">
-                                  <p:stCondLst>
-                                    <p:cond delay="0"/>
-                                  </p:stCondLst>
-                                  <p:childTnLst>
-                                    <p:set>
-                                      <p:cBhvr>
-                                        <p:cTn id="6" dur="1" fill="hold">
-                                          <p:stCondLst>
-                                            <p:cond delay="0"/>
-                                          </p:stCondLst>
-                                        </p:cTn>
-                                        <p:tgtEl>
-                                          <p:spTgt spid="5"/>
-                                        </p:tgtEl>
-                                        <p:attrNameLst>
-                                          <p:attrName>style.visibility</p:attrName>
-                                        </p:attrNameLst>
-                                      </p:cBhvr>
-                                      <p:to>
-                                        <p:strVal val="visible"/>
-                                      </p:to>
-                                    </p:set>
-                                  </p:childTnLst>
-                                </p:cTn>
-                              </p:par>
-                            </p:childTnLst>
-                          </p:cTn>
-                        </p:par>
-                      </p:childTnLst>
-                    </p:cTn>
-                  </p:par>
-                </p:childTnLst>
-              </p:cTn>
-              <p:prevCondLst>
-                <p:cond evt="onPrev" delay="0">
-                  <p:tgtEl>
-                    <p:sldTgt/>
-                  </p:tgtEl>
-                </p:cond>
-              </p:prevCondLst>
-              <p:nextCondLst>
-                <p:cond evt="onNext" delay="0">
-                  <p:tgtEl>
-                    <p:sldTgt/>
-                  </p:tgtEl>
-                </p:cond>
-              </p:nextCondLst>
-            </p:seq>
-          </p:childTnLst>
-        </p:cTn>
+        <p:cTn id="1" dur="indefinite" restart="never" nodeType="tmRoot"/>
       </p:par>
     </p:tnLst>
   </p:timing>

</xml_diff>